<commit_message>
@carlyledavis:  Experimenting with rendering strategies.
</commit_message>
<xml_diff>
--- a/services/studio/src/test/resources/initialize/BLT-44.pptx
+++ b/services/studio/src/test/resources/initialize/BLT-44.pptx
@@ -650,7 +650,7 @@
               </a14:hiddenFill>
             </a:ext>
             <a:ext uri="{FAA26D3D-D897-4be2-8F04-BA451C77F1D7}">
-              <ma14:placeholderFlag xmlns:ma14="http://schemas.microsoft.com/office/mac/drawingml/2011/main" xmlns="" val="1"/>
+              <ma14:placeholderFlag xmlns="" xmlns:ma14="http://schemas.microsoft.com/office/mac/drawingml/2011/main" val="1"/>
             </a:ext>
           </a:extLst>
         </p:spPr>
@@ -686,7 +686,7 @@
               </a14:hiddenLine>
             </a:ext>
             <a:ext uri="{FAA26D3D-D897-4be2-8F04-BA451C77F1D7}">
-              <ma14:placeholderFlag xmlns:ma14="http://schemas.microsoft.com/office/mac/drawingml/2011/main" xmlns="" val="1"/>
+              <ma14:placeholderFlag xmlns="" xmlns:ma14="http://schemas.microsoft.com/office/mac/drawingml/2011/main" val="1"/>
             </a:ext>
           </a:extLst>
         </p:spPr>
@@ -3788,7 +3788,7 @@
               </a14:hiddenLine>
             </a:ext>
             <a:ext uri="{FAA26D3D-D897-4be2-8F04-BA451C77F1D7}">
-              <ma14:placeholderFlag xmlns:ma14="http://schemas.microsoft.com/office/mac/drawingml/2011/main" xmlns="" val="1"/>
+              <ma14:placeholderFlag xmlns="" xmlns:ma14="http://schemas.microsoft.com/office/mac/drawingml/2011/main" val="1"/>
             </a:ext>
           </a:extLst>
         </p:spPr>
@@ -3849,7 +3849,7 @@
               </a14:hiddenLine>
             </a:ext>
             <a:ext uri="{FAA26D3D-D897-4be2-8F04-BA451C77F1D7}">
-              <ma14:placeholderFlag xmlns:ma14="http://schemas.microsoft.com/office/mac/drawingml/2011/main" xmlns="" val="1"/>
+              <ma14:placeholderFlag xmlns="" xmlns:ma14="http://schemas.microsoft.com/office/mac/drawingml/2011/main" val="1"/>
             </a:ext>
           </a:extLst>
         </p:spPr>
@@ -7153,8 +7153,8 @@
         </p:nvCxnSpPr>
         <p:spPr>
           <a:xfrm flipH="1" flipV="1">
-            <a:off x="4848671" y="3843837"/>
-            <a:ext cx="4015136" cy="1507626"/>
+            <a:off x="8156448" y="2127250"/>
+            <a:ext cx="707359" cy="3224213"/>
           </a:xfrm>
           <a:prstGeom prst="line">
             <a:avLst/>
@@ -7199,8 +7199,8 @@
         </p:nvCxnSpPr>
         <p:spPr>
           <a:xfrm flipH="1" flipV="1">
-            <a:off x="7740650" y="3456487"/>
-            <a:ext cx="4246185" cy="1757050"/>
+            <a:off x="10387584" y="1911350"/>
+            <a:ext cx="1599251" cy="3302187"/>
           </a:xfrm>
           <a:prstGeom prst="line">
             <a:avLst/>

</xml_diff>